<commit_message>
28/8/2562 20:07 windows update [PF Week4 Assignment modify]
</commit_message>
<xml_diff>
--- a/Semester1-1/Programming fundamental/Assignment/W4_28-8-2562/Assignment/PseudoCode/PseudoCode.pptx
+++ b/Semester1-1/Programming fundamental/Assignment/W4_28-8-2562/Assignment/PseudoCode/PseudoCode.pptx
@@ -6132,6 +6132,318 @@
           </a:p>
         </p:txBody>
       </p:sp>
+      <p:cxnSp>
+        <p:nvCxnSpPr>
+          <p:cNvPr id="3" name="ลูกศรเชื่อมต่อแบบตรง 2">
+            <a:extLst>
+              <a:ext uri="{FF2B5EF4-FFF2-40B4-BE49-F238E27FC236}">
+                <a16:creationId xmlns:a16="http://schemas.microsoft.com/office/drawing/2014/main" id="{D6BA3D66-56C8-4093-83A7-BEC8E6F11301}"/>
+              </a:ext>
+            </a:extLst>
+          </p:cNvPr>
+          <p:cNvCxnSpPr>
+            <a:cxnSpLocks/>
+            <a:endCxn id="9" idx="1"/>
+          </p:cNvCxnSpPr>
+          <p:nvPr/>
+        </p:nvCxnSpPr>
+        <p:spPr>
+          <a:xfrm>
+            <a:off x="3924180" y="1885760"/>
+            <a:ext cx="148843" cy="0"/>
+          </a:xfrm>
+          <a:prstGeom prst="straightConnector1">
+            <a:avLst/>
+          </a:prstGeom>
+          <a:ln>
+            <a:solidFill>
+              <a:srgbClr val="FF0000"/>
+            </a:solidFill>
+            <a:tailEnd type="triangle"/>
+          </a:ln>
+        </p:spPr>
+        <p:style>
+          <a:lnRef idx="1">
+            <a:schemeClr val="accent1"/>
+          </a:lnRef>
+          <a:fillRef idx="0">
+            <a:schemeClr val="accent1"/>
+          </a:fillRef>
+          <a:effectRef idx="0">
+            <a:schemeClr val="accent1"/>
+          </a:effectRef>
+          <a:fontRef idx="minor">
+            <a:schemeClr val="tx1"/>
+          </a:fontRef>
+        </p:style>
+      </p:cxnSp>
+      <p:cxnSp>
+        <p:nvCxnSpPr>
+          <p:cNvPr id="23" name="ลูกศรเชื่อมต่อแบบตรง 22">
+            <a:extLst>
+              <a:ext uri="{FF2B5EF4-FFF2-40B4-BE49-F238E27FC236}">
+                <a16:creationId xmlns:a16="http://schemas.microsoft.com/office/drawing/2014/main" id="{277E2DDD-D8B2-4B1A-A787-14DD2B007235}"/>
+              </a:ext>
+            </a:extLst>
+          </p:cNvPr>
+          <p:cNvCxnSpPr>
+            <a:cxnSpLocks/>
+            <a:endCxn id="11" idx="1"/>
+          </p:cNvCxnSpPr>
+          <p:nvPr/>
+        </p:nvCxnSpPr>
+        <p:spPr>
+          <a:xfrm>
+            <a:off x="3924180" y="2398840"/>
+            <a:ext cx="148843" cy="353231"/>
+          </a:xfrm>
+          <a:prstGeom prst="straightConnector1">
+            <a:avLst/>
+          </a:prstGeom>
+          <a:ln>
+            <a:solidFill>
+              <a:srgbClr val="FF0000"/>
+            </a:solidFill>
+            <a:tailEnd type="triangle"/>
+          </a:ln>
+        </p:spPr>
+        <p:style>
+          <a:lnRef idx="1">
+            <a:schemeClr val="accent1"/>
+          </a:lnRef>
+          <a:fillRef idx="0">
+            <a:schemeClr val="accent1"/>
+          </a:fillRef>
+          <a:effectRef idx="0">
+            <a:schemeClr val="accent1"/>
+          </a:effectRef>
+          <a:fontRef idx="minor">
+            <a:schemeClr val="tx1"/>
+          </a:fontRef>
+        </p:style>
+      </p:cxnSp>
+      <p:cxnSp>
+        <p:nvCxnSpPr>
+          <p:cNvPr id="27" name="ลูกศรเชื่อมต่อแบบตรง 26">
+            <a:extLst>
+              <a:ext uri="{FF2B5EF4-FFF2-40B4-BE49-F238E27FC236}">
+                <a16:creationId xmlns:a16="http://schemas.microsoft.com/office/drawing/2014/main" id="{06A3D06F-03C2-4667-A68A-5162BA430AE1}"/>
+              </a:ext>
+            </a:extLst>
+          </p:cNvPr>
+          <p:cNvCxnSpPr>
+            <a:cxnSpLocks/>
+            <a:endCxn id="28" idx="1"/>
+          </p:cNvCxnSpPr>
+          <p:nvPr/>
+        </p:nvCxnSpPr>
+        <p:spPr>
+          <a:xfrm>
+            <a:off x="3924180" y="3003360"/>
+            <a:ext cx="148843" cy="641806"/>
+          </a:xfrm>
+          <a:prstGeom prst="straightConnector1">
+            <a:avLst/>
+          </a:prstGeom>
+          <a:ln>
+            <a:solidFill>
+              <a:srgbClr val="FF0000"/>
+            </a:solidFill>
+            <a:tailEnd type="triangle"/>
+          </a:ln>
+        </p:spPr>
+        <p:style>
+          <a:lnRef idx="1">
+            <a:schemeClr val="accent1"/>
+          </a:lnRef>
+          <a:fillRef idx="0">
+            <a:schemeClr val="accent1"/>
+          </a:fillRef>
+          <a:effectRef idx="0">
+            <a:schemeClr val="accent1"/>
+          </a:effectRef>
+          <a:fontRef idx="minor">
+            <a:schemeClr val="tx1"/>
+          </a:fontRef>
+        </p:style>
+      </p:cxnSp>
+      <p:cxnSp>
+        <p:nvCxnSpPr>
+          <p:cNvPr id="29" name="ลูกศรเชื่อมต่อแบบตรง 28">
+            <a:extLst>
+              <a:ext uri="{FF2B5EF4-FFF2-40B4-BE49-F238E27FC236}">
+                <a16:creationId xmlns:a16="http://schemas.microsoft.com/office/drawing/2014/main" id="{3E35ED77-5CCD-4B27-8BE5-EED2352A4DD6}"/>
+              </a:ext>
+            </a:extLst>
+          </p:cNvPr>
+          <p:cNvCxnSpPr>
+            <a:cxnSpLocks/>
+          </p:cNvCxnSpPr>
+          <p:nvPr/>
+        </p:nvCxnSpPr>
+        <p:spPr>
+          <a:xfrm>
+            <a:off x="6309065" y="2758231"/>
+            <a:ext cx="148843" cy="0"/>
+          </a:xfrm>
+          <a:prstGeom prst="straightConnector1">
+            <a:avLst/>
+          </a:prstGeom>
+          <a:ln>
+            <a:solidFill>
+              <a:srgbClr val="FF0000"/>
+            </a:solidFill>
+            <a:tailEnd type="triangle"/>
+          </a:ln>
+        </p:spPr>
+        <p:style>
+          <a:lnRef idx="1">
+            <a:schemeClr val="accent1"/>
+          </a:lnRef>
+          <a:fillRef idx="0">
+            <a:schemeClr val="accent1"/>
+          </a:fillRef>
+          <a:effectRef idx="0">
+            <a:schemeClr val="accent1"/>
+          </a:effectRef>
+          <a:fontRef idx="minor">
+            <a:schemeClr val="tx1"/>
+          </a:fontRef>
+        </p:style>
+      </p:cxnSp>
+      <p:cxnSp>
+        <p:nvCxnSpPr>
+          <p:cNvPr id="30" name="ลูกศรเชื่อมต่อแบบตรง 29">
+            <a:extLst>
+              <a:ext uri="{FF2B5EF4-FFF2-40B4-BE49-F238E27FC236}">
+                <a16:creationId xmlns:a16="http://schemas.microsoft.com/office/drawing/2014/main" id="{FF5ECDD9-DBFE-4912-8F23-6F4ECD24F23E}"/>
+              </a:ext>
+            </a:extLst>
+          </p:cNvPr>
+          <p:cNvCxnSpPr>
+            <a:cxnSpLocks/>
+            <a:endCxn id="35" idx="1"/>
+          </p:cNvCxnSpPr>
+          <p:nvPr/>
+        </p:nvCxnSpPr>
+        <p:spPr>
+          <a:xfrm>
+            <a:off x="6309064" y="3645166"/>
+            <a:ext cx="148844" cy="896458"/>
+          </a:xfrm>
+          <a:prstGeom prst="straightConnector1">
+            <a:avLst/>
+          </a:prstGeom>
+          <a:ln>
+            <a:solidFill>
+              <a:srgbClr val="FF0000"/>
+            </a:solidFill>
+            <a:tailEnd type="triangle"/>
+          </a:ln>
+        </p:spPr>
+        <p:style>
+          <a:lnRef idx="1">
+            <a:schemeClr val="accent1"/>
+          </a:lnRef>
+          <a:fillRef idx="0">
+            <a:schemeClr val="accent1"/>
+          </a:fillRef>
+          <a:effectRef idx="0">
+            <a:schemeClr val="accent1"/>
+          </a:effectRef>
+          <a:fontRef idx="minor">
+            <a:schemeClr val="tx1"/>
+          </a:fontRef>
+        </p:style>
+      </p:cxnSp>
+      <p:cxnSp>
+        <p:nvCxnSpPr>
+          <p:cNvPr id="31" name="ลูกศรเชื่อมต่อแบบตรง 30">
+            <a:extLst>
+              <a:ext uri="{FF2B5EF4-FFF2-40B4-BE49-F238E27FC236}">
+                <a16:creationId xmlns:a16="http://schemas.microsoft.com/office/drawing/2014/main" id="{531E016B-B6EA-4226-9D92-5D858ED5ED7B}"/>
+              </a:ext>
+            </a:extLst>
+          </p:cNvPr>
+          <p:cNvCxnSpPr>
+            <a:cxnSpLocks/>
+          </p:cNvCxnSpPr>
+          <p:nvPr/>
+        </p:nvCxnSpPr>
+        <p:spPr>
+          <a:xfrm>
+            <a:off x="8808424" y="2752071"/>
+            <a:ext cx="148843" cy="0"/>
+          </a:xfrm>
+          <a:prstGeom prst="straightConnector1">
+            <a:avLst/>
+          </a:prstGeom>
+          <a:ln>
+            <a:solidFill>
+              <a:srgbClr val="FF0000"/>
+            </a:solidFill>
+            <a:tailEnd type="triangle"/>
+          </a:ln>
+        </p:spPr>
+        <p:style>
+          <a:lnRef idx="1">
+            <a:schemeClr val="accent1"/>
+          </a:lnRef>
+          <a:fillRef idx="0">
+            <a:schemeClr val="accent1"/>
+          </a:fillRef>
+          <a:effectRef idx="0">
+            <a:schemeClr val="accent1"/>
+          </a:effectRef>
+          <a:fontRef idx="minor">
+            <a:schemeClr val="tx1"/>
+          </a:fontRef>
+        </p:style>
+      </p:cxnSp>
+      <p:cxnSp>
+        <p:nvCxnSpPr>
+          <p:cNvPr id="32" name="ลูกศรเชื่อมต่อแบบตรง 31">
+            <a:extLst>
+              <a:ext uri="{FF2B5EF4-FFF2-40B4-BE49-F238E27FC236}">
+                <a16:creationId xmlns:a16="http://schemas.microsoft.com/office/drawing/2014/main" id="{F1F41773-5A58-4F16-9CB5-A336D019D612}"/>
+              </a:ext>
+            </a:extLst>
+          </p:cNvPr>
+          <p:cNvCxnSpPr>
+            <a:cxnSpLocks/>
+          </p:cNvCxnSpPr>
+          <p:nvPr/>
+        </p:nvCxnSpPr>
+        <p:spPr>
+          <a:xfrm>
+            <a:off x="8808424" y="4547784"/>
+            <a:ext cx="148843" cy="0"/>
+          </a:xfrm>
+          <a:prstGeom prst="straightConnector1">
+            <a:avLst/>
+          </a:prstGeom>
+          <a:ln>
+            <a:solidFill>
+              <a:srgbClr val="FF0000"/>
+            </a:solidFill>
+            <a:tailEnd type="triangle"/>
+          </a:ln>
+        </p:spPr>
+        <p:style>
+          <a:lnRef idx="1">
+            <a:schemeClr val="accent1"/>
+          </a:lnRef>
+          <a:fillRef idx="0">
+            <a:schemeClr val="accent1"/>
+          </a:fillRef>
+          <a:effectRef idx="0">
+            <a:schemeClr val="accent1"/>
+          </a:effectRef>
+          <a:fontRef idx="minor">
+            <a:schemeClr val="tx1"/>
+          </a:fontRef>
+        </p:style>
+      </p:cxnSp>
     </p:spTree>
     <p:extLst>
       <p:ext uri="{BB962C8B-B14F-4D97-AF65-F5344CB8AC3E}">
@@ -7196,6 +7508,9 @@
             <a:avLst/>
           </a:prstGeom>
           <a:ln>
+            <a:solidFill>
+              <a:srgbClr val="FF0000"/>
+            </a:solidFill>
             <a:tailEnd type="triangle"/>
           </a:ln>
         </p:spPr>
@@ -7239,6 +7554,9 @@
             <a:avLst/>
           </a:prstGeom>
           <a:ln>
+            <a:solidFill>
+              <a:srgbClr val="FF0000"/>
+            </a:solidFill>
             <a:tailEnd type="triangle"/>
           </a:ln>
         </p:spPr>
@@ -7855,12 +8173,15 @@
         <p:spPr>
           <a:xfrm>
             <a:off x="7904086" y="3156011"/>
-            <a:ext cx="190869" cy="199748"/>
+            <a:ext cx="190869" cy="0"/>
           </a:xfrm>
           <a:prstGeom prst="straightConnector1">
             <a:avLst/>
           </a:prstGeom>
           <a:ln>
+            <a:solidFill>
+              <a:srgbClr val="FF0000"/>
+            </a:solidFill>
             <a:tailEnd type="triangle"/>
           </a:ln>
         </p:spPr>
@@ -9236,6 +9557,9 @@
             <a:avLst/>
           </a:prstGeom>
           <a:ln>
+            <a:solidFill>
+              <a:srgbClr val="FF0000"/>
+            </a:solidFill>
             <a:tailEnd type="triangle"/>
           </a:ln>
         </p:spPr>
@@ -9279,6 +9603,9 @@
             <a:avLst/>
           </a:prstGeom>
           <a:ln>
+            <a:solidFill>
+              <a:srgbClr val="FF0000"/>
+            </a:solidFill>
             <a:tailEnd type="triangle"/>
           </a:ln>
         </p:spPr>
@@ -9788,6 +10115,9 @@
             <a:avLst/>
           </a:prstGeom>
           <a:ln>
+            <a:solidFill>
+              <a:srgbClr val="FF0000"/>
+            </a:solidFill>
             <a:tailEnd type="triangle"/>
           </a:ln>
         </p:spPr>

</xml_diff>